<commit_message>
chore: resource container info
</commit_message>
<xml_diff>
--- a/Diagrams.pptx
+++ b/Diagrams.pptx
@@ -266,7 +266,7 @@
           <a:p>
             <a:fld id="{02CA9660-C4A0-4511-BC3F-E2A3E10180BD}" type="datetimeFigureOut">
               <a:rPr lang="en-GB" smtClean="0"/>
-              <a:t>28/08/2024</a:t>
+              <a:t>29/08/2024</a:t>
             </a:fld>
             <a:endParaRPr lang="en-GB"/>
           </a:p>
@@ -466,7 +466,7 @@
           <a:p>
             <a:fld id="{02CA9660-C4A0-4511-BC3F-E2A3E10180BD}" type="datetimeFigureOut">
               <a:rPr lang="en-GB" smtClean="0"/>
-              <a:t>28/08/2024</a:t>
+              <a:t>29/08/2024</a:t>
             </a:fld>
             <a:endParaRPr lang="en-GB"/>
           </a:p>
@@ -676,7 +676,7 @@
           <a:p>
             <a:fld id="{02CA9660-C4A0-4511-BC3F-E2A3E10180BD}" type="datetimeFigureOut">
               <a:rPr lang="en-GB" smtClean="0"/>
-              <a:t>28/08/2024</a:t>
+              <a:t>29/08/2024</a:t>
             </a:fld>
             <a:endParaRPr lang="en-GB"/>
           </a:p>
@@ -876,7 +876,7 @@
           <a:p>
             <a:fld id="{02CA9660-C4A0-4511-BC3F-E2A3E10180BD}" type="datetimeFigureOut">
               <a:rPr lang="en-GB" smtClean="0"/>
-              <a:t>28/08/2024</a:t>
+              <a:t>29/08/2024</a:t>
             </a:fld>
             <a:endParaRPr lang="en-GB"/>
           </a:p>
@@ -1152,7 +1152,7 @@
           <a:p>
             <a:fld id="{02CA9660-C4A0-4511-BC3F-E2A3E10180BD}" type="datetimeFigureOut">
               <a:rPr lang="en-GB" smtClean="0"/>
-              <a:t>28/08/2024</a:t>
+              <a:t>29/08/2024</a:t>
             </a:fld>
             <a:endParaRPr lang="en-GB"/>
           </a:p>
@@ -1420,7 +1420,7 @@
           <a:p>
             <a:fld id="{02CA9660-C4A0-4511-BC3F-E2A3E10180BD}" type="datetimeFigureOut">
               <a:rPr lang="en-GB" smtClean="0"/>
-              <a:t>28/08/2024</a:t>
+              <a:t>29/08/2024</a:t>
             </a:fld>
             <a:endParaRPr lang="en-GB"/>
           </a:p>
@@ -1835,7 +1835,7 @@
           <a:p>
             <a:fld id="{02CA9660-C4A0-4511-BC3F-E2A3E10180BD}" type="datetimeFigureOut">
               <a:rPr lang="en-GB" smtClean="0"/>
-              <a:t>28/08/2024</a:t>
+              <a:t>29/08/2024</a:t>
             </a:fld>
             <a:endParaRPr lang="en-GB"/>
           </a:p>
@@ -1977,7 +1977,7 @@
           <a:p>
             <a:fld id="{02CA9660-C4A0-4511-BC3F-E2A3E10180BD}" type="datetimeFigureOut">
               <a:rPr lang="en-GB" smtClean="0"/>
-              <a:t>28/08/2024</a:t>
+              <a:t>29/08/2024</a:t>
             </a:fld>
             <a:endParaRPr lang="en-GB"/>
           </a:p>
@@ -2090,7 +2090,7 @@
           <a:p>
             <a:fld id="{02CA9660-C4A0-4511-BC3F-E2A3E10180BD}" type="datetimeFigureOut">
               <a:rPr lang="en-GB" smtClean="0"/>
-              <a:t>28/08/2024</a:t>
+              <a:t>29/08/2024</a:t>
             </a:fld>
             <a:endParaRPr lang="en-GB"/>
           </a:p>
@@ -2403,7 +2403,7 @@
           <a:p>
             <a:fld id="{02CA9660-C4A0-4511-BC3F-E2A3E10180BD}" type="datetimeFigureOut">
               <a:rPr lang="en-GB" smtClean="0"/>
-              <a:t>28/08/2024</a:t>
+              <a:t>29/08/2024</a:t>
             </a:fld>
             <a:endParaRPr lang="en-GB"/>
           </a:p>
@@ -2692,7 +2692,7 @@
           <a:p>
             <a:fld id="{02CA9660-C4A0-4511-BC3F-E2A3E10180BD}" type="datetimeFigureOut">
               <a:rPr lang="en-GB" smtClean="0"/>
-              <a:t>28/08/2024</a:t>
+              <a:t>29/08/2024</a:t>
             </a:fld>
             <a:endParaRPr lang="en-GB"/>
           </a:p>
@@ -2935,7 +2935,7 @@
           <a:p>
             <a:fld id="{02CA9660-C4A0-4511-BC3F-E2A3E10180BD}" type="datetimeFigureOut">
               <a:rPr lang="en-GB" smtClean="0"/>
-              <a:t>28/08/2024</a:t>
+              <a:t>29/08/2024</a:t>
             </a:fld>
             <a:endParaRPr lang="en-GB"/>
           </a:p>
@@ -4575,8 +4575,8 @@
         </p:nvSpPr>
         <p:spPr>
           <a:xfrm>
-            <a:off x="2135589" y="585604"/>
-            <a:ext cx="4972833" cy="5846512"/>
+            <a:off x="2135589" y="306888"/>
+            <a:ext cx="4972833" cy="6125228"/>
           </a:xfrm>
           <a:prstGeom prst="rect">
             <a:avLst/>
@@ -4667,7 +4667,7 @@
         </p:nvSpPr>
         <p:spPr>
           <a:xfrm>
-            <a:off x="4086220" y="613150"/>
+            <a:off x="4086220" y="293737"/>
             <a:ext cx="1071576" cy="369332"/>
           </a:xfrm>
           <a:prstGeom prst="rect">
@@ -4939,8 +4939,8 @@
         </p:nvSpPr>
         <p:spPr>
           <a:xfrm>
-            <a:off x="2246169" y="1005819"/>
-            <a:ext cx="4710112" cy="291116"/>
+            <a:off x="2246168" y="1005819"/>
+            <a:ext cx="4640402" cy="291116"/>
           </a:xfrm>
           <a:prstGeom prst="rect">
             <a:avLst/>
@@ -5741,6 +5741,53 @@
                 </a:solidFill>
               </a:rPr>
               <a:t>x Number of Dynamic Collections</a:t>
+            </a:r>
+          </a:p>
+        </p:txBody>
+      </p:sp>
+      <p:sp>
+        <p:nvSpPr>
+          <p:cNvPr id="2" name="Rectangle 1">
+            <a:extLst>
+              <a:ext uri="{FF2B5EF4-FFF2-40B4-BE49-F238E27FC236}">
+                <a16:creationId xmlns:a16="http://schemas.microsoft.com/office/drawing/2014/main" id="{452FE996-19E7-76B3-CF0B-F0395EDD565D}"/>
+              </a:ext>
+            </a:extLst>
+          </p:cNvPr>
+          <p:cNvSpPr/>
+          <p:nvPr/>
+        </p:nvSpPr>
+        <p:spPr>
+          <a:xfrm>
+            <a:off x="2246170" y="720298"/>
+            <a:ext cx="4640400" cy="291116"/>
+          </a:xfrm>
+          <a:prstGeom prst="rect">
+            <a:avLst/>
+          </a:prstGeom>
+        </p:spPr>
+        <p:style>
+          <a:lnRef idx="2">
+            <a:schemeClr val="dk1"/>
+          </a:lnRef>
+          <a:fillRef idx="1">
+            <a:schemeClr val="lt1"/>
+          </a:fillRef>
+          <a:effectRef idx="0">
+            <a:schemeClr val="dk1"/>
+          </a:effectRef>
+          <a:fontRef idx="minor">
+            <a:schemeClr val="dk1"/>
+          </a:fontRef>
+        </p:style>
+        <p:txBody>
+          <a:bodyPr rtlCol="0" anchor="ctr"/>
+          <a:lstStyle/>
+          <a:p>
+            <a:pPr algn="ctr"/>
+            <a:r>
+              <a:rPr lang="en-GB" sz="1050" b="1" dirty="0"/>
+              <a:t>Byte Length of Snapshot [int – 4 bytes]</a:t>
             </a:r>
           </a:p>
         </p:txBody>

</xml_diff>

<commit_message>
chore: resource container lock type
</commit_message>
<xml_diff>
--- a/Diagrams.pptx
+++ b/Diagrams.pptx
@@ -266,7 +266,7 @@
           <a:p>
             <a:fld id="{02CA9660-C4A0-4511-BC3F-E2A3E10180BD}" type="datetimeFigureOut">
               <a:rPr lang="en-GB" smtClean="0"/>
-              <a:t>29/08/2024</a:t>
+              <a:t>01/09/2024</a:t>
             </a:fld>
             <a:endParaRPr lang="en-GB"/>
           </a:p>
@@ -466,7 +466,7 @@
           <a:p>
             <a:fld id="{02CA9660-C4A0-4511-BC3F-E2A3E10180BD}" type="datetimeFigureOut">
               <a:rPr lang="en-GB" smtClean="0"/>
-              <a:t>29/08/2024</a:t>
+              <a:t>01/09/2024</a:t>
             </a:fld>
             <a:endParaRPr lang="en-GB"/>
           </a:p>
@@ -676,7 +676,7 @@
           <a:p>
             <a:fld id="{02CA9660-C4A0-4511-BC3F-E2A3E10180BD}" type="datetimeFigureOut">
               <a:rPr lang="en-GB" smtClean="0"/>
-              <a:t>29/08/2024</a:t>
+              <a:t>01/09/2024</a:t>
             </a:fld>
             <a:endParaRPr lang="en-GB"/>
           </a:p>
@@ -876,7 +876,7 @@
           <a:p>
             <a:fld id="{02CA9660-C4A0-4511-BC3F-E2A3E10180BD}" type="datetimeFigureOut">
               <a:rPr lang="en-GB" smtClean="0"/>
-              <a:t>29/08/2024</a:t>
+              <a:t>01/09/2024</a:t>
             </a:fld>
             <a:endParaRPr lang="en-GB"/>
           </a:p>
@@ -1152,7 +1152,7 @@
           <a:p>
             <a:fld id="{02CA9660-C4A0-4511-BC3F-E2A3E10180BD}" type="datetimeFigureOut">
               <a:rPr lang="en-GB" smtClean="0"/>
-              <a:t>29/08/2024</a:t>
+              <a:t>01/09/2024</a:t>
             </a:fld>
             <a:endParaRPr lang="en-GB"/>
           </a:p>
@@ -1420,7 +1420,7 @@
           <a:p>
             <a:fld id="{02CA9660-C4A0-4511-BC3F-E2A3E10180BD}" type="datetimeFigureOut">
               <a:rPr lang="en-GB" smtClean="0"/>
-              <a:t>29/08/2024</a:t>
+              <a:t>01/09/2024</a:t>
             </a:fld>
             <a:endParaRPr lang="en-GB"/>
           </a:p>
@@ -1835,7 +1835,7 @@
           <a:p>
             <a:fld id="{02CA9660-C4A0-4511-BC3F-E2A3E10180BD}" type="datetimeFigureOut">
               <a:rPr lang="en-GB" smtClean="0"/>
-              <a:t>29/08/2024</a:t>
+              <a:t>01/09/2024</a:t>
             </a:fld>
             <a:endParaRPr lang="en-GB"/>
           </a:p>
@@ -1977,7 +1977,7 @@
           <a:p>
             <a:fld id="{02CA9660-C4A0-4511-BC3F-E2A3E10180BD}" type="datetimeFigureOut">
               <a:rPr lang="en-GB" smtClean="0"/>
-              <a:t>29/08/2024</a:t>
+              <a:t>01/09/2024</a:t>
             </a:fld>
             <a:endParaRPr lang="en-GB"/>
           </a:p>
@@ -2090,7 +2090,7 @@
           <a:p>
             <a:fld id="{02CA9660-C4A0-4511-BC3F-E2A3E10180BD}" type="datetimeFigureOut">
               <a:rPr lang="en-GB" smtClean="0"/>
-              <a:t>29/08/2024</a:t>
+              <a:t>01/09/2024</a:t>
             </a:fld>
             <a:endParaRPr lang="en-GB"/>
           </a:p>
@@ -2403,7 +2403,7 @@
           <a:p>
             <a:fld id="{02CA9660-C4A0-4511-BC3F-E2A3E10180BD}" type="datetimeFigureOut">
               <a:rPr lang="en-GB" smtClean="0"/>
-              <a:t>29/08/2024</a:t>
+              <a:t>01/09/2024</a:t>
             </a:fld>
             <a:endParaRPr lang="en-GB"/>
           </a:p>
@@ -2692,7 +2692,7 @@
           <a:p>
             <a:fld id="{02CA9660-C4A0-4511-BC3F-E2A3E10180BD}" type="datetimeFigureOut">
               <a:rPr lang="en-GB" smtClean="0"/>
-              <a:t>29/08/2024</a:t>
+              <a:t>01/09/2024</a:t>
             </a:fld>
             <a:endParaRPr lang="en-GB"/>
           </a:p>
@@ -2935,7 +2935,7 @@
           <a:p>
             <a:fld id="{02CA9660-C4A0-4511-BC3F-E2A3E10180BD}" type="datetimeFigureOut">
               <a:rPr lang="en-GB" smtClean="0"/>
-              <a:t>29/08/2024</a:t>
+              <a:t>01/09/2024</a:t>
             </a:fld>
             <a:endParaRPr lang="en-GB"/>
           </a:p>
@@ -12627,6 +12627,100 @@
           </a:p>
         </p:txBody>
       </p:sp>
+      <p:sp>
+        <p:nvSpPr>
+          <p:cNvPr id="4" name="Rectangle 3">
+            <a:extLst>
+              <a:ext uri="{FF2B5EF4-FFF2-40B4-BE49-F238E27FC236}">
+                <a16:creationId xmlns:a16="http://schemas.microsoft.com/office/drawing/2014/main" id="{1C80FA4E-1493-5902-6363-2B117516A296}"/>
+              </a:ext>
+            </a:extLst>
+          </p:cNvPr>
+          <p:cNvSpPr/>
+          <p:nvPr/>
+        </p:nvSpPr>
+        <p:spPr>
+          <a:xfrm>
+            <a:off x="1400175" y="1175511"/>
+            <a:ext cx="1835149" cy="291116"/>
+          </a:xfrm>
+          <a:prstGeom prst="rect">
+            <a:avLst/>
+          </a:prstGeom>
+        </p:spPr>
+        <p:style>
+          <a:lnRef idx="2">
+            <a:schemeClr val="dk1"/>
+          </a:lnRef>
+          <a:fillRef idx="1">
+            <a:schemeClr val="lt1"/>
+          </a:fillRef>
+          <a:effectRef idx="0">
+            <a:schemeClr val="dk1"/>
+          </a:effectRef>
+          <a:fontRef idx="minor">
+            <a:schemeClr val="dk1"/>
+          </a:fontRef>
+        </p:style>
+        <p:txBody>
+          <a:bodyPr rtlCol="0" anchor="ctr"/>
+          <a:lstStyle/>
+          <a:p>
+            <a:pPr algn="ctr"/>
+            <a:r>
+              <a:rPr lang="en-GB" sz="1050" b="1" dirty="0"/>
+              <a:t>Identifier Type [1 byte]</a:t>
+            </a:r>
+          </a:p>
+        </p:txBody>
+      </p:sp>
+      <p:sp>
+        <p:nvSpPr>
+          <p:cNvPr id="7" name="Rectangle 6">
+            <a:extLst>
+              <a:ext uri="{FF2B5EF4-FFF2-40B4-BE49-F238E27FC236}">
+                <a16:creationId xmlns:a16="http://schemas.microsoft.com/office/drawing/2014/main" id="{09CE8966-3A89-07EC-DC21-97E4CDC36F29}"/>
+              </a:ext>
+            </a:extLst>
+          </p:cNvPr>
+          <p:cNvSpPr/>
+          <p:nvPr/>
+        </p:nvSpPr>
+        <p:spPr>
+          <a:xfrm>
+            <a:off x="3235324" y="1175511"/>
+            <a:ext cx="1622383" cy="291116"/>
+          </a:xfrm>
+          <a:prstGeom prst="rect">
+            <a:avLst/>
+          </a:prstGeom>
+        </p:spPr>
+        <p:style>
+          <a:lnRef idx="2">
+            <a:schemeClr val="dk1"/>
+          </a:lnRef>
+          <a:fillRef idx="1">
+            <a:schemeClr val="lt1"/>
+          </a:fillRef>
+          <a:effectRef idx="0">
+            <a:schemeClr val="dk1"/>
+          </a:effectRef>
+          <a:fontRef idx="minor">
+            <a:schemeClr val="dk1"/>
+          </a:fontRef>
+        </p:style>
+        <p:txBody>
+          <a:bodyPr rtlCol="0" anchor="ctr"/>
+          <a:lstStyle/>
+          <a:p>
+            <a:pPr algn="ctr"/>
+            <a:r>
+              <a:rPr lang="en-GB" sz="1050" b="1" dirty="0"/>
+              <a:t>ID [ushort – 2 bytes]</a:t>
+            </a:r>
+          </a:p>
+        </p:txBody>
+      </p:sp>
     </p:spTree>
     <p:extLst>
       <p:ext uri="{BB962C8B-B14F-4D97-AF65-F5344CB8AC3E}">

</xml_diff>